<commit_message>
Minor fixes to first prototype
</commit_message>
<xml_diff>
--- a/Milestone_2/Prototypes/1/1.pptx
+++ b/Milestone_2/Prototypes/1/1.pptx
@@ -5963,7 +5963,7 @@
             <a:pPr algn="ctr"/>
             <a:r>
               <a:rPr lang="en-US" sz="13800" dirty="0"/>
-              <a:t>Loren</a:t>
+              <a:t>Lorem</a:t>
             </a:r>
           </a:p>
         </p:txBody>
@@ -8127,7 +8127,7 @@
             <a:pPr algn="ctr"/>
             <a:r>
               <a:rPr lang="en-US" sz="13800" dirty="0"/>
-              <a:t>Loren</a:t>
+              <a:t>Lorem</a:t>
             </a:r>
           </a:p>
         </p:txBody>
@@ -15128,7 +15128,7 @@
         <p:spPr>
           <a:xfrm>
             <a:off x="6832246" y="4772157"/>
-            <a:ext cx="5351363" cy="2031325"/>
+            <a:ext cx="5351363" cy="1754326"/>
           </a:xfrm>
           <a:prstGeom prst="rect">
             <a:avLst/>
@@ -15142,6 +15142,193 @@
           <a:lstStyle/>
           <a:p>
             <a:r>
+              <a:rPr lang="en-US" dirty="0" err="1"/>
+              <a:t>Vivamus</a:t>
+            </a:r>
+            <a:r>
+              <a:rPr lang="en-US" dirty="0"/>
+              <a:t> </a:t>
+            </a:r>
+            <a:r>
+              <a:rPr lang="en-US" dirty="0" err="1"/>
+              <a:t>urna</a:t>
+            </a:r>
+            <a:r>
+              <a:rPr lang="en-US" dirty="0"/>
+              <a:t> </a:t>
+            </a:r>
+            <a:r>
+              <a:rPr lang="en-US" dirty="0" err="1"/>
+              <a:t>arcu</a:t>
+            </a:r>
+            <a:r>
+              <a:rPr lang="en-US" dirty="0"/>
+              <a:t>, maximus </a:t>
+            </a:r>
+            <a:r>
+              <a:rPr lang="en-US" dirty="0" err="1"/>
+              <a:t>sed</a:t>
+            </a:r>
+            <a:r>
+              <a:rPr lang="en-US" dirty="0"/>
+              <a:t> </a:t>
+            </a:r>
+            <a:r>
+              <a:rPr lang="en-US" dirty="0" err="1"/>
+              <a:t>viverra</a:t>
+            </a:r>
+            <a:r>
+              <a:rPr lang="en-US" dirty="0"/>
+              <a:t> </a:t>
+            </a:r>
+            <a:r>
+              <a:rPr lang="en-US" dirty="0" err="1"/>
+              <a:t>vel</a:t>
+            </a:r>
+            <a:r>
+              <a:rPr lang="en-US" dirty="0"/>
+              <a:t>, </a:t>
+            </a:r>
+            <a:r>
+              <a:rPr lang="en-US" dirty="0" err="1"/>
+              <a:t>scelerisque</a:t>
+            </a:r>
+            <a:r>
+              <a:rPr lang="en-US" dirty="0"/>
+              <a:t> </a:t>
+            </a:r>
+            <a:r>
+              <a:rPr lang="en-US" dirty="0" err="1"/>
+              <a:t>tincidunt</a:t>
+            </a:r>
+            <a:r>
+              <a:rPr lang="en-US" dirty="0"/>
+              <a:t> </a:t>
+            </a:r>
+            <a:r>
+              <a:rPr lang="en-US" dirty="0" err="1"/>
+              <a:t>metus</a:t>
+            </a:r>
+            <a:r>
+              <a:rPr lang="en-US" dirty="0"/>
+              <a:t>. </a:t>
+            </a:r>
+            <a:r>
+              <a:rPr lang="en-US" dirty="0" err="1"/>
+              <a:t>Donec</a:t>
+            </a:r>
+            <a:r>
+              <a:rPr lang="en-US" dirty="0"/>
+              <a:t> </a:t>
+            </a:r>
+            <a:r>
+              <a:rPr lang="en-US" dirty="0" err="1"/>
+              <a:t>laoreet</a:t>
+            </a:r>
+            <a:r>
+              <a:rPr lang="en-US" dirty="0"/>
+              <a:t> </a:t>
+            </a:r>
+            <a:r>
+              <a:rPr lang="en-US" dirty="0" err="1"/>
+              <a:t>tellus</a:t>
+            </a:r>
+            <a:r>
+              <a:rPr lang="en-US" dirty="0"/>
+              <a:t> </a:t>
+            </a:r>
+            <a:r>
+              <a:rPr lang="en-US" dirty="0" err="1"/>
+              <a:t>eu</a:t>
+            </a:r>
+            <a:r>
+              <a:rPr lang="en-US" dirty="0"/>
+              <a:t> </a:t>
+            </a:r>
+            <a:r>
+              <a:rPr lang="en-US" dirty="0" err="1"/>
+              <a:t>orci</a:t>
+            </a:r>
+            <a:r>
+              <a:rPr lang="en-US" dirty="0"/>
+              <a:t> </a:t>
+            </a:r>
+            <a:r>
+              <a:rPr lang="en-US" dirty="0" err="1"/>
+              <a:t>rutrum</a:t>
+            </a:r>
+            <a:r>
+              <a:rPr lang="en-US" dirty="0"/>
+              <a:t>, et </a:t>
+            </a:r>
+            <a:r>
+              <a:rPr lang="en-US" dirty="0" err="1"/>
+              <a:t>viverra</a:t>
+            </a:r>
+            <a:r>
+              <a:rPr lang="en-US" dirty="0"/>
+              <a:t> </a:t>
+            </a:r>
+            <a:r>
+              <a:rPr lang="en-US" dirty="0" err="1"/>
+              <a:t>eros</a:t>
+            </a:r>
+            <a:r>
+              <a:rPr lang="en-US" dirty="0"/>
+              <a:t> </a:t>
+            </a:r>
+            <a:r>
+              <a:rPr lang="en-US" dirty="0" err="1"/>
+              <a:t>tincidunt</a:t>
+            </a:r>
+            <a:r>
+              <a:rPr lang="en-US" dirty="0"/>
+              <a:t>. </a:t>
+            </a:r>
+            <a:r>
+              <a:rPr lang="en-US" dirty="0" err="1"/>
+              <a:t>Nullam</a:t>
+            </a:r>
+            <a:r>
+              <a:rPr lang="en-US" dirty="0"/>
+              <a:t> </a:t>
+            </a:r>
+            <a:r>
+              <a:rPr lang="en-US" dirty="0" err="1"/>
+              <a:t>sapien</a:t>
+            </a:r>
+            <a:r>
+              <a:rPr lang="en-US" dirty="0"/>
+              <a:t> magna, </a:t>
+            </a:r>
+            <a:r>
+              <a:rPr lang="en-US" dirty="0" err="1"/>
+              <a:t>aliquam</a:t>
+            </a:r>
+            <a:r>
+              <a:rPr lang="en-US" dirty="0"/>
+              <a:t> et </a:t>
+            </a:r>
+            <a:r>
+              <a:rPr lang="en-US" dirty="0" err="1"/>
+              <a:t>scelerisque</a:t>
+            </a:r>
+            <a:r>
+              <a:rPr lang="en-US" dirty="0"/>
+              <a:t> in, </a:t>
+            </a:r>
+            <a:r>
+              <a:rPr lang="en-US" dirty="0" err="1"/>
+              <a:t>fringilla</a:t>
+            </a:r>
+            <a:r>
+              <a:rPr lang="en-US" dirty="0"/>
+              <a:t> et magna.</a:t>
+            </a:r>
+            <a:endParaRPr lang="en-US" altLang="ja-JP" dirty="0"/>
+          </a:p>
+          <a:p>
+            <a:r>
               <a:rPr lang="ja-JP" altLang="en-US" dirty="0"/>
               <a:t>視</a:t>
             </a:r>
@@ -15151,23 +15338,14 @@
             </a:r>
             <a:r>
               <a:rPr lang="ja-JP" altLang="en-US" dirty="0"/>
-              <a:t>マネ増日</a:t>
-            </a:r>
-            <a:r>
-              <a:rPr lang="en-US" altLang="ja-JP" dirty="0"/>
-              <a:t>46</a:t>
-            </a:r>
+              <a:t>マネ増日。</a:t>
+            </a:r>
+            <a:endParaRPr lang="en-US" altLang="ja-JP" dirty="0"/>
+          </a:p>
+          <a:p>
             <a:r>
               <a:rPr lang="ja-JP" altLang="en-US" dirty="0"/>
-              <a:t>元</a:t>
-            </a:r>
-            <a:r>
-              <a:rPr lang="en-US" altLang="ja-JP" dirty="0"/>
-              <a:t>34</a:t>
-            </a:r>
-            <a:r>
-              <a:rPr lang="ja-JP" altLang="en-US" dirty="0"/>
-              <a:t>日アヒク間真</a:t>
+              <a:t>アヒク間真</a:t>
             </a:r>
             <a:r>
               <a:rPr lang="ja-JP" altLang="en-US" dirty="0" err="1"/>
@@ -15175,32 +15353,9 @@
             </a:r>
             <a:r>
               <a:rPr lang="ja-JP" altLang="en-US" dirty="0"/>
-              <a:t>係向極くな模景トヨイク健考ま新雰おばこび提両ッ定供らびト投妓さむ内館単ぼはを達庭転たむ。全しン開査ト用事能よろばほ撤探トクメツ黄骨告メ協応るほ質京ウ変時ろ組景げゅこク掲</a:t>
-            </a:r>
-            <a:r>
-              <a:rPr lang="en-US" altLang="ja-JP" dirty="0"/>
-              <a:t>78</a:t>
-            </a:r>
-            <a:r>
-              <a:rPr lang="ja-JP" altLang="en-US" dirty="0"/>
-              <a:t>逮ユテ社女も</a:t>
-            </a:r>
-            <a:r>
-              <a:rPr lang="ja-JP" altLang="en-US" dirty="0" err="1"/>
-              <a:t>ど</a:t>
-            </a:r>
-            <a:r>
-              <a:rPr lang="ja-JP" altLang="en-US" dirty="0"/>
-              <a:t>らく著重ヱヌタ芸行ロ被飯重なひ電</a:t>
-            </a:r>
-            <a:r>
-              <a:rPr lang="en-US" altLang="ja-JP" dirty="0"/>
-              <a:t>30</a:t>
-            </a:r>
-            <a:r>
-              <a:rPr lang="ja-JP" altLang="en-US" dirty="0"/>
-              <a:t>帯アレヌ私業理が。</a:t>
-            </a:r>
+              <a:t>係向極くな模景。</a:t>
+            </a:r>
+            <a:endParaRPr lang="en-US" altLang="ja-JP" dirty="0"/>
           </a:p>
         </p:txBody>
       </p:sp>
@@ -16623,7 +16778,7 @@
             <a:pPr algn="ctr"/>
             <a:r>
               <a:rPr lang="en-US" sz="13800" dirty="0"/>
-              <a:t>Loren</a:t>
+              <a:t>Lorem</a:t>
             </a:r>
           </a:p>
         </p:txBody>
@@ -23385,7 +23540,7 @@
             <a:pPr algn="ctr"/>
             <a:r>
               <a:rPr lang="en-US" sz="13800" dirty="0"/>
-              <a:t>Loren</a:t>
+              <a:t>Lorem</a:t>
             </a:r>
           </a:p>
         </p:txBody>

</xml_diff>